<commit_message>
Updated with Jen's recommended changes.
</commit_message>
<xml_diff>
--- a/project DAG_1.pptx
+++ b/project DAG_1.pptx
@@ -104,6 +104,22 @@
       </a:defRPr>
     </a:lvl9pPr>
   </p:defaultTextStyle>
+  <p:extLst>
+    <p:ext uri="{EFAFB233-063F-42B5-8137-9DF3F51BA10A}">
+      <p15:sldGuideLst xmlns:p15="http://schemas.microsoft.com/office/powerpoint/2012/main">
+        <p15:guide id="1" orient="horz" pos="2160">
+          <p15:clr>
+            <a:srgbClr val="A4A3A4"/>
+          </p15:clr>
+        </p15:guide>
+        <p15:guide id="2" pos="3840">
+          <p15:clr>
+            <a:srgbClr val="A4A3A4"/>
+          </p15:clr>
+        </p15:guide>
+      </p15:sldGuideLst>
+    </p:ext>
+  </p:extLst>
 </p:presentation>
 </file>
 
@@ -236,7 +252,7 @@
           <a:p>
             <a:fld id="{FD528A33-1EE3-43E2-A704-2463C31128F5}" type="datetimeFigureOut">
               <a:rPr lang="en-US" smtClean="0"/>
-              <a:t>1/27/2017</a:t>
+              <a:t>1/30/2017</a:t>
             </a:fld>
             <a:endParaRPr lang="en-US"/>
           </a:p>
@@ -404,7 +420,7 @@
           <a:p>
             <a:fld id="{FD528A33-1EE3-43E2-A704-2463C31128F5}" type="datetimeFigureOut">
               <a:rPr lang="en-US" smtClean="0"/>
-              <a:t>1/27/2017</a:t>
+              <a:t>1/30/2017</a:t>
             </a:fld>
             <a:endParaRPr lang="en-US"/>
           </a:p>
@@ -582,7 +598,7 @@
           <a:p>
             <a:fld id="{FD528A33-1EE3-43E2-A704-2463C31128F5}" type="datetimeFigureOut">
               <a:rPr lang="en-US" smtClean="0"/>
-              <a:t>1/27/2017</a:t>
+              <a:t>1/30/2017</a:t>
             </a:fld>
             <a:endParaRPr lang="en-US"/>
           </a:p>
@@ -750,7 +766,7 @@
           <a:p>
             <a:fld id="{FD528A33-1EE3-43E2-A704-2463C31128F5}" type="datetimeFigureOut">
               <a:rPr lang="en-US" smtClean="0"/>
-              <a:t>1/27/2017</a:t>
+              <a:t>1/30/2017</a:t>
             </a:fld>
             <a:endParaRPr lang="en-US"/>
           </a:p>
@@ -995,7 +1011,7 @@
           <a:p>
             <a:fld id="{FD528A33-1EE3-43E2-A704-2463C31128F5}" type="datetimeFigureOut">
               <a:rPr lang="en-US" smtClean="0"/>
-              <a:t>1/27/2017</a:t>
+              <a:t>1/30/2017</a:t>
             </a:fld>
             <a:endParaRPr lang="en-US"/>
           </a:p>
@@ -1224,7 +1240,7 @@
           <a:p>
             <a:fld id="{FD528A33-1EE3-43E2-A704-2463C31128F5}" type="datetimeFigureOut">
               <a:rPr lang="en-US" smtClean="0"/>
-              <a:t>1/27/2017</a:t>
+              <a:t>1/30/2017</a:t>
             </a:fld>
             <a:endParaRPr lang="en-US"/>
           </a:p>
@@ -1588,7 +1604,7 @@
           <a:p>
             <a:fld id="{FD528A33-1EE3-43E2-A704-2463C31128F5}" type="datetimeFigureOut">
               <a:rPr lang="en-US" smtClean="0"/>
-              <a:t>1/27/2017</a:t>
+              <a:t>1/30/2017</a:t>
             </a:fld>
             <a:endParaRPr lang="en-US"/>
           </a:p>
@@ -1705,7 +1721,7 @@
           <a:p>
             <a:fld id="{FD528A33-1EE3-43E2-A704-2463C31128F5}" type="datetimeFigureOut">
               <a:rPr lang="en-US" smtClean="0"/>
-              <a:t>1/27/2017</a:t>
+              <a:t>1/30/2017</a:t>
             </a:fld>
             <a:endParaRPr lang="en-US"/>
           </a:p>
@@ -1800,7 +1816,7 @@
           <a:p>
             <a:fld id="{FD528A33-1EE3-43E2-A704-2463C31128F5}" type="datetimeFigureOut">
               <a:rPr lang="en-US" smtClean="0"/>
-              <a:t>1/27/2017</a:t>
+              <a:t>1/30/2017</a:t>
             </a:fld>
             <a:endParaRPr lang="en-US"/>
           </a:p>
@@ -2075,7 +2091,7 @@
           <a:p>
             <a:fld id="{FD528A33-1EE3-43E2-A704-2463C31128F5}" type="datetimeFigureOut">
               <a:rPr lang="en-US" smtClean="0"/>
-              <a:t>1/27/2017</a:t>
+              <a:t>1/30/2017</a:t>
             </a:fld>
             <a:endParaRPr lang="en-US"/>
           </a:p>
@@ -2327,7 +2343,7 @@
           <a:p>
             <a:fld id="{FD528A33-1EE3-43E2-A704-2463C31128F5}" type="datetimeFigureOut">
               <a:rPr lang="en-US" smtClean="0"/>
-              <a:t>1/27/2017</a:t>
+              <a:t>1/30/2017</a:t>
             </a:fld>
             <a:endParaRPr lang="en-US"/>
           </a:p>
@@ -2538,7 +2554,7 @@
           <a:p>
             <a:fld id="{FD528A33-1EE3-43E2-A704-2463C31128F5}" type="datetimeFigureOut">
               <a:rPr lang="en-US" smtClean="0"/>
-              <a:t>1/27/2017</a:t>
+              <a:t>1/30/2017</a:t>
             </a:fld>
             <a:endParaRPr lang="en-US"/>
           </a:p>
@@ -3499,6 +3515,39 @@
           </a:fontRef>
         </p:style>
       </p:cxnSp>
+      <p:cxnSp>
+        <p:nvCxnSpPr>
+          <p:cNvPr id="19" name="Straight Arrow Connector 18"/>
+          <p:cNvCxnSpPr/>
+          <p:nvPr/>
+        </p:nvCxnSpPr>
+        <p:spPr>
+          <a:xfrm flipH="1" flipV="1">
+            <a:off x="5166360" y="3667539"/>
+            <a:ext cx="396240" cy="386302"/>
+          </a:xfrm>
+          <a:prstGeom prst="straightConnector1">
+            <a:avLst/>
+          </a:prstGeom>
+          <a:ln>
+            <a:tailEnd type="triangle"/>
+          </a:ln>
+        </p:spPr>
+        <p:style>
+          <a:lnRef idx="1">
+            <a:schemeClr val="accent1"/>
+          </a:lnRef>
+          <a:fillRef idx="0">
+            <a:schemeClr val="accent1"/>
+          </a:fillRef>
+          <a:effectRef idx="0">
+            <a:schemeClr val="accent1"/>
+          </a:effectRef>
+          <a:fontRef idx="minor">
+            <a:schemeClr val="tx1"/>
+          </a:fontRef>
+        </p:style>
+      </p:cxnSp>
     </p:spTree>
     <p:extLst>
       <p:ext uri="{BB962C8B-B14F-4D97-AF65-F5344CB8AC3E}">
@@ -3801,7 +3850,7 @@
   <a:extraClrSchemeLst/>
   <a:extLst>
     <a:ext uri="{05A4C25C-085E-4340-85A3-A5531E510DB2}">
-      <thm15:themeFamily xmlns:thm15="http://schemas.microsoft.com/office/thememl/2012/main" xmlns="" name="Office Theme" id="{62F939B6-93AF-4DB8-9C6B-D6C7DFDC589F}" vid="{4A3C46E8-61CC-4603-A589-7422A47A8E4A}"/>
+      <thm15:themeFamily xmlns:thm15="http://schemas.microsoft.com/office/thememl/2012/main" name="Office Theme" id="{62F939B6-93AF-4DB8-9C6B-D6C7DFDC589F}" vid="{4A3C46E8-61CC-4603-A589-7422A47A8E4A}"/>
     </a:ext>
   </a:extLst>
 </a:theme>

</xml_diff>